<commit_message>
Add Recording; Exercises 8-16
</commit_message>
<xml_diff>
--- a/2020/slides/04 - Summary and Resources.pptx
+++ b/2020/slides/04 - Summary and Resources.pptx
@@ -278,7 +278,7 @@
           <a:p>
             <a:fld id="{5B29B2E8-5B77-4225-ACDF-4C38702F37FD}" type="datetimeFigureOut">
               <a:rPr lang="en-US" smtClean="0"/>
-              <a:t>1/7/2021</a:t>
+              <a:t>1/18/2021</a:t>
             </a:fld>
             <a:endParaRPr lang="en-US"/>
           </a:p>
@@ -478,7 +478,7 @@
           <a:p>
             <a:fld id="{5B29B2E8-5B77-4225-ACDF-4C38702F37FD}" type="datetimeFigureOut">
               <a:rPr lang="en-US" smtClean="0"/>
-              <a:t>1/7/2021</a:t>
+              <a:t>1/18/2021</a:t>
             </a:fld>
             <a:endParaRPr lang="en-US"/>
           </a:p>
@@ -688,7 +688,7 @@
           <a:p>
             <a:fld id="{5B29B2E8-5B77-4225-ACDF-4C38702F37FD}" type="datetimeFigureOut">
               <a:rPr lang="en-US" smtClean="0"/>
-              <a:t>1/7/2021</a:t>
+              <a:t>1/18/2021</a:t>
             </a:fld>
             <a:endParaRPr lang="en-US"/>
           </a:p>
@@ -888,7 +888,7 @@
           <a:p>
             <a:fld id="{5B29B2E8-5B77-4225-ACDF-4C38702F37FD}" type="datetimeFigureOut">
               <a:rPr lang="en-US" smtClean="0"/>
-              <a:t>1/7/2021</a:t>
+              <a:t>1/18/2021</a:t>
             </a:fld>
             <a:endParaRPr lang="en-US"/>
           </a:p>
@@ -1164,7 +1164,7 @@
           <a:p>
             <a:fld id="{5B29B2E8-5B77-4225-ACDF-4C38702F37FD}" type="datetimeFigureOut">
               <a:rPr lang="en-US" smtClean="0"/>
-              <a:t>1/7/2021</a:t>
+              <a:t>1/18/2021</a:t>
             </a:fld>
             <a:endParaRPr lang="en-US"/>
           </a:p>
@@ -1432,7 +1432,7 @@
           <a:p>
             <a:fld id="{5B29B2E8-5B77-4225-ACDF-4C38702F37FD}" type="datetimeFigureOut">
               <a:rPr lang="en-US" smtClean="0"/>
-              <a:t>1/7/2021</a:t>
+              <a:t>1/18/2021</a:t>
             </a:fld>
             <a:endParaRPr lang="en-US"/>
           </a:p>
@@ -1847,7 +1847,7 @@
           <a:p>
             <a:fld id="{5B29B2E8-5B77-4225-ACDF-4C38702F37FD}" type="datetimeFigureOut">
               <a:rPr lang="en-US" smtClean="0"/>
-              <a:t>1/7/2021</a:t>
+              <a:t>1/18/2021</a:t>
             </a:fld>
             <a:endParaRPr lang="en-US"/>
           </a:p>
@@ -1989,7 +1989,7 @@
           <a:p>
             <a:fld id="{5B29B2E8-5B77-4225-ACDF-4C38702F37FD}" type="datetimeFigureOut">
               <a:rPr lang="en-US" smtClean="0"/>
-              <a:t>1/7/2021</a:t>
+              <a:t>1/18/2021</a:t>
             </a:fld>
             <a:endParaRPr lang="en-US"/>
           </a:p>
@@ -2102,7 +2102,7 @@
           <a:p>
             <a:fld id="{5B29B2E8-5B77-4225-ACDF-4C38702F37FD}" type="datetimeFigureOut">
               <a:rPr lang="en-US" smtClean="0"/>
-              <a:t>1/7/2021</a:t>
+              <a:t>1/18/2021</a:t>
             </a:fld>
             <a:endParaRPr lang="en-US"/>
           </a:p>
@@ -2415,7 +2415,7 @@
           <a:p>
             <a:fld id="{5B29B2E8-5B77-4225-ACDF-4C38702F37FD}" type="datetimeFigureOut">
               <a:rPr lang="en-US" smtClean="0"/>
-              <a:t>1/7/2021</a:t>
+              <a:t>1/18/2021</a:t>
             </a:fld>
             <a:endParaRPr lang="en-US"/>
           </a:p>
@@ -2704,7 +2704,7 @@
           <a:p>
             <a:fld id="{5B29B2E8-5B77-4225-ACDF-4C38702F37FD}" type="datetimeFigureOut">
               <a:rPr lang="en-US" smtClean="0"/>
-              <a:t>1/7/2021</a:t>
+              <a:t>1/18/2021</a:t>
             </a:fld>
             <a:endParaRPr lang="en-US"/>
           </a:p>
@@ -2947,7 +2947,7 @@
           <a:p>
             <a:fld id="{5B29B2E8-5B77-4225-ACDF-4C38702F37FD}" type="datetimeFigureOut">
               <a:rPr lang="en-US" smtClean="0"/>
-              <a:t>1/7/2021</a:t>
+              <a:t>1/18/2021</a:t>
             </a:fld>
             <a:endParaRPr lang="en-US"/>
           </a:p>
@@ -4484,7 +4484,7 @@
         <p:spPr>
           <a:xfrm>
             <a:off x="838200" y="1690688"/>
-            <a:ext cx="8051157" cy="3221266"/>
+            <a:ext cx="8051157" cy="3752181"/>
           </a:xfrm>
           <a:prstGeom prst="rect">
             <a:avLst/>
@@ -4574,6 +4574,42 @@
                 <a:cs typeface="Open Sans" panose="020B0606030504020204" pitchFamily="34" charset="0"/>
               </a:rPr>
               <a:t>and experiment in a notebook.</a:t>
+            </a:r>
+          </a:p>
+          <a:p>
+            <a:pPr marL="457200" indent="-457200">
+              <a:lnSpc>
+                <a:spcPct val="150000"/>
+              </a:lnSpc>
+              <a:buClr>
+                <a:srgbClr val="FF0066"/>
+              </a:buClr>
+              <a:buFont typeface="Arial" panose="020B0604020202020204" pitchFamily="34" charset="0"/>
+              <a:buChar char="•"/>
+            </a:pPr>
+            <a:r>
+              <a:rPr lang="en-US" sz="2300" dirty="0">
+                <a:latin typeface="Open Sans" panose="020B0606030504020204" pitchFamily="34" charset="0"/>
+                <a:ea typeface="Open Sans" panose="020B0606030504020204" pitchFamily="34" charset="0"/>
+                <a:cs typeface="Open Sans" panose="020B0606030504020204" pitchFamily="34" charset="0"/>
+              </a:rPr>
+              <a:t>Have a look at the </a:t>
+            </a:r>
+            <a:r>
+              <a:rPr lang="en-US" sz="2300" b="1" dirty="0">
+                <a:latin typeface="Open Sans" panose="020B0606030504020204" pitchFamily="34" charset="0"/>
+                <a:ea typeface="Open Sans" panose="020B0606030504020204" pitchFamily="34" charset="0"/>
+                <a:cs typeface="Open Sans" panose="020B0606030504020204" pitchFamily="34" charset="0"/>
+              </a:rPr>
+              <a:t>Commenting in Python</a:t>
+            </a:r>
+            <a:r>
+              <a:rPr lang="en-US" sz="2300" dirty="0">
+                <a:latin typeface="Open Sans" panose="020B0606030504020204" pitchFamily="34" charset="0"/>
+                <a:ea typeface="Open Sans" panose="020B0606030504020204" pitchFamily="34" charset="0"/>
+                <a:cs typeface="Open Sans" panose="020B0606030504020204" pitchFamily="34" charset="0"/>
+              </a:rPr>
+              <a:t> primer.</a:t>
             </a:r>
           </a:p>
           <a:p>

</xml_diff>